<commit_message>
update team number to number 4
</commit_message>
<xml_diff>
--- a/project Documentation/First week/FirstWeekReview.pptx
+++ b/project Documentation/First week/FirstWeekReview.pptx
@@ -313,7 +313,6 @@
     </c:plotArea>
     <c:legend>
       <c:legendPos val="b"/>
-      <c:layout/>
       <c:overlay val="0"/>
       <c:spPr>
         <a:noFill/>
@@ -547,7 +546,6 @@
     </c:plotArea>
     <c:legend>
       <c:legendPos val="b"/>
-      <c:layout/>
       <c:overlay val="0"/>
       <c:spPr>
         <a:noFill/>
@@ -1897,7 +1895,7 @@
           <a:p>
             <a:fld id="{784DEA67-A527-4F06-A600-7F7A8BECD40D}" type="datetimeFigureOut">
               <a:rPr lang="en-US" smtClean="0"/>
-              <a:t>6/1/2020</a:t>
+              <a:t>6/6/2020</a:t>
             </a:fld>
             <a:endParaRPr lang="en-US"/>
           </a:p>
@@ -2062,7 +2060,7 @@
           <a:p>
             <a:fld id="{784DEA67-A527-4F06-A600-7F7A8BECD40D}" type="datetimeFigureOut">
               <a:rPr lang="en-US" smtClean="0"/>
-              <a:t>6/1/2020</a:t>
+              <a:t>6/6/2020</a:t>
             </a:fld>
             <a:endParaRPr lang="en-US"/>
           </a:p>
@@ -2237,7 +2235,7 @@
           <a:p>
             <a:fld id="{784DEA67-A527-4F06-A600-7F7A8BECD40D}" type="datetimeFigureOut">
               <a:rPr lang="en-US" smtClean="0"/>
-              <a:t>6/1/2020</a:t>
+              <a:t>6/6/2020</a:t>
             </a:fld>
             <a:endParaRPr lang="en-US"/>
           </a:p>
@@ -2402,7 +2400,7 @@
           <a:p>
             <a:fld id="{784DEA67-A527-4F06-A600-7F7A8BECD40D}" type="datetimeFigureOut">
               <a:rPr lang="en-US" smtClean="0"/>
-              <a:t>6/1/2020</a:t>
+              <a:t>6/6/2020</a:t>
             </a:fld>
             <a:endParaRPr lang="en-US"/>
           </a:p>
@@ -2643,7 +2641,7 @@
           <a:p>
             <a:fld id="{784DEA67-A527-4F06-A600-7F7A8BECD40D}" type="datetimeFigureOut">
               <a:rPr lang="en-US" smtClean="0"/>
-              <a:t>6/1/2020</a:t>
+              <a:t>6/6/2020</a:t>
             </a:fld>
             <a:endParaRPr lang="en-US"/>
           </a:p>
@@ -2926,7 +2924,7 @@
           <a:p>
             <a:fld id="{784DEA67-A527-4F06-A600-7F7A8BECD40D}" type="datetimeFigureOut">
               <a:rPr lang="en-US" smtClean="0"/>
-              <a:t>6/1/2020</a:t>
+              <a:t>6/6/2020</a:t>
             </a:fld>
             <a:endParaRPr lang="en-US"/>
           </a:p>
@@ -3343,7 +3341,7 @@
           <a:p>
             <a:fld id="{784DEA67-A527-4F06-A600-7F7A8BECD40D}" type="datetimeFigureOut">
               <a:rPr lang="en-US" smtClean="0"/>
-              <a:t>6/1/2020</a:t>
+              <a:t>6/6/2020</a:t>
             </a:fld>
             <a:endParaRPr lang="en-US"/>
           </a:p>
@@ -3456,7 +3454,7 @@
           <a:p>
             <a:fld id="{784DEA67-A527-4F06-A600-7F7A8BECD40D}" type="datetimeFigureOut">
               <a:rPr lang="en-US" smtClean="0"/>
-              <a:t>6/1/2020</a:t>
+              <a:t>6/6/2020</a:t>
             </a:fld>
             <a:endParaRPr lang="en-US"/>
           </a:p>
@@ -3546,7 +3544,7 @@
           <a:p>
             <a:fld id="{784DEA67-A527-4F06-A600-7F7A8BECD40D}" type="datetimeFigureOut">
               <a:rPr lang="en-US" smtClean="0"/>
-              <a:t>6/1/2020</a:t>
+              <a:t>6/6/2020</a:t>
             </a:fld>
             <a:endParaRPr lang="en-US"/>
           </a:p>
@@ -3818,7 +3816,7 @@
           <a:p>
             <a:fld id="{784DEA67-A527-4F06-A600-7F7A8BECD40D}" type="datetimeFigureOut">
               <a:rPr lang="en-US" smtClean="0"/>
-              <a:t>6/1/2020</a:t>
+              <a:t>6/6/2020</a:t>
             </a:fld>
             <a:endParaRPr lang="en-US"/>
           </a:p>
@@ -4066,7 +4064,7 @@
           <a:p>
             <a:fld id="{784DEA67-A527-4F06-A600-7F7A8BECD40D}" type="datetimeFigureOut">
               <a:rPr lang="en-US" smtClean="0"/>
-              <a:t>6/1/2020</a:t>
+              <a:t>6/6/2020</a:t>
             </a:fld>
             <a:endParaRPr lang="en-US"/>
           </a:p>
@@ -4274,7 +4272,7 @@
           <a:p>
             <a:fld id="{784DEA67-A527-4F06-A600-7F7A8BECD40D}" type="datetimeFigureOut">
               <a:rPr lang="en-US" smtClean="0"/>
-              <a:t>6/1/2020</a:t>
+              <a:t>6/6/2020</a:t>
             </a:fld>
             <a:endParaRPr lang="en-US"/>
           </a:p>
@@ -4708,7 +4706,7 @@
         <p:spPr>
           <a:xfrm>
             <a:off x="395536" y="908720"/>
-            <a:ext cx="1190454" cy="830997"/>
+            <a:ext cx="1312732" cy="830997"/>
           </a:xfrm>
           <a:prstGeom prst="rect">
             <a:avLst/>
@@ -4743,7 +4741,18 @@
                 </a:solidFill>
                 <a:latin typeface="Futura Md BT" pitchFamily="34" charset="0"/>
               </a:rPr>
-              <a:t>Team II</a:t>
+              <a:t>Team </a:t>
+            </a:r>
+            <a:r>
+              <a:rPr lang="en-US" sz="2400" dirty="0" smtClean="0">
+                <a:solidFill>
+                  <a:schemeClr val="accent1">
+                    <a:lumMod val="75000"/>
+                  </a:schemeClr>
+                </a:solidFill>
+                <a:latin typeface="Futura Md BT" pitchFamily="34" charset="0"/>
+              </a:rPr>
+              <a:t>IV</a:t>
             </a:r>
             <a:endParaRPr lang="en-US" sz="2400" dirty="0">
               <a:solidFill>

</xml_diff>